<commit_message>
[!] Prejdenie prezentacii, opravena fotka mojej malickosti
</commit_message>
<xml_diff>
--- a/Dokumentacie/Ostatne/Prezentacie/LS/Tim10-akcna_prezntacia.pptx
+++ b/Dokumentacie/Ostatne/Prezentacie/LS/Tim10-akcna_prezntacia.pptx
@@ -196,7 +196,7 @@
             <a:fld id="{A55AD7BD-EC15-4D9C-A5DA-E6DD9ABF2B75}" type="datetimeFigureOut">
               <a:rPr lang="sk-SK" smtClean="0"/>
               <a:pPr/>
-              <a:t>8. 6. 2012</a:t>
+              <a:t>13. 6. 2012</a:t>
             </a:fld>
             <a:endParaRPr lang="sk-SK"/>
           </a:p>
@@ -1771,7 +1771,7 @@
                 </a:solidFill>
               </a:rPr>
               <a:pPr/>
-              <a:t>8. 6. 2012</a:t>
+              <a:t>13. 6. 2012</a:t>
             </a:fld>
             <a:endParaRPr lang="sk-SK" dirty="0">
               <a:solidFill>
@@ -1968,7 +1968,7 @@
                 </a:solidFill>
               </a:rPr>
               <a:pPr/>
-              <a:t>8. 6. 2012</a:t>
+              <a:t>13. 6. 2012</a:t>
             </a:fld>
             <a:endParaRPr lang="sk-SK" dirty="0">
               <a:solidFill>
@@ -2175,7 +2175,7 @@
                 </a:solidFill>
               </a:rPr>
               <a:pPr/>
-              <a:t>8. 6. 2012</a:t>
+              <a:t>13. 6. 2012</a:t>
             </a:fld>
             <a:endParaRPr lang="sk-SK" dirty="0">
               <a:solidFill>
@@ -2372,7 +2372,7 @@
                 </a:solidFill>
               </a:rPr>
               <a:pPr/>
-              <a:t>8. 6. 2012</a:t>
+              <a:t>13. 6. 2012</a:t>
             </a:fld>
             <a:endParaRPr lang="sk-SK" dirty="0">
               <a:solidFill>
@@ -2645,7 +2645,7 @@
                 </a:solidFill>
               </a:rPr>
               <a:pPr/>
-              <a:t>8. 6. 2012</a:t>
+              <a:t>13. 6. 2012</a:t>
             </a:fld>
             <a:endParaRPr lang="sk-SK" dirty="0">
               <a:solidFill>
@@ -2960,7 +2960,7 @@
                 </a:solidFill>
               </a:rPr>
               <a:pPr/>
-              <a:t>8. 6. 2012</a:t>
+              <a:t>13. 6. 2012</a:t>
             </a:fld>
             <a:endParaRPr lang="sk-SK" dirty="0">
               <a:solidFill>
@@ -3409,7 +3409,7 @@
                 </a:solidFill>
               </a:rPr>
               <a:pPr/>
-              <a:t>8. 6. 2012</a:t>
+              <a:t>13. 6. 2012</a:t>
             </a:fld>
             <a:endParaRPr lang="sk-SK" dirty="0">
               <a:solidFill>
@@ -3554,7 +3554,7 @@
                 </a:solidFill>
               </a:rPr>
               <a:pPr/>
-              <a:t>8. 6. 2012</a:t>
+              <a:t>13. 6. 2012</a:t>
             </a:fld>
             <a:endParaRPr lang="sk-SK" dirty="0">
               <a:solidFill>
@@ -3676,7 +3676,7 @@
                 </a:solidFill>
               </a:rPr>
               <a:pPr/>
-              <a:t>8. 6. 2012</a:t>
+              <a:t>13. 6. 2012</a:t>
             </a:fld>
             <a:endParaRPr lang="sk-SK" dirty="0">
               <a:solidFill>
@@ -3980,7 +3980,7 @@
                 </a:solidFill>
               </a:rPr>
               <a:pPr/>
-              <a:t>8. 6. 2012</a:t>
+              <a:t>13. 6. 2012</a:t>
             </a:fld>
             <a:endParaRPr lang="sk-SK" dirty="0">
               <a:solidFill>
@@ -4260,7 +4260,7 @@
                 </a:solidFill>
               </a:rPr>
               <a:pPr/>
-              <a:t>8. 6. 2012</a:t>
+              <a:t>13. 6. 2012</a:t>
             </a:fld>
             <a:endParaRPr lang="sk-SK" dirty="0">
               <a:solidFill>
@@ -4523,7 +4523,7 @@
                 </a:solidFill>
               </a:rPr>
               <a:pPr/>
-              <a:t>8. 6. 2012</a:t>
+              <a:t>13. 6. 2012</a:t>
             </a:fld>
             <a:endParaRPr lang="sk-SK" dirty="0">
               <a:solidFill>
@@ -5853,6 +5853,9 @@
                     <p:cTn id="3" fill="hold">
                       <p:stCondLst>
                         <p:cond delay="indefinite"/>
+                        <p:cond evt="onBegin" delay="0">
+                          <p:tn val="2"/>
+                        </p:cond>
                       </p:stCondLst>
                       <p:childTnLst>
                         <p:par>
@@ -5862,7 +5865,7 @@
                             </p:stCondLst>
                             <p:childTnLst>
                               <p:par>
-                                <p:cTn id="5" presetID="12" presetClass="entr" presetSubtype="4" fill="hold" grpId="0" nodeType="clickEffect">
+                                <p:cTn id="5" presetID="12" presetClass="entr" presetSubtype="4" fill="hold" grpId="0" nodeType="withEffect">
                                   <p:stCondLst>
                                     <p:cond delay="0"/>
                                   </p:stCondLst>
@@ -5899,30 +5902,21 @@
                             </p:childTnLst>
                           </p:cTn>
                         </p:par>
-                      </p:childTnLst>
-                    </p:cTn>
-                  </p:par>
-                  <p:par>
-                    <p:cTn id="8" fill="hold">
-                      <p:stCondLst>
-                        <p:cond delay="indefinite"/>
-                      </p:stCondLst>
-                      <p:childTnLst>
                         <p:par>
-                          <p:cTn id="9" fill="hold">
+                          <p:cTn id="8" fill="hold">
                             <p:stCondLst>
-                              <p:cond delay="0"/>
+                              <p:cond delay="500"/>
                             </p:stCondLst>
                             <p:childTnLst>
                               <p:par>
-                                <p:cTn id="10" presetID="53" presetClass="entr" presetSubtype="0" fill="hold" nodeType="clickEffect">
+                                <p:cTn id="9" presetID="53" presetClass="entr" presetSubtype="0" fill="hold" nodeType="afterEffect">
                                   <p:stCondLst>
                                     <p:cond delay="0"/>
                                   </p:stCondLst>
                                   <p:childTnLst>
                                     <p:set>
                                       <p:cBhvr>
-                                        <p:cTn id="11" dur="1" fill="hold">
+                                        <p:cTn id="10" dur="1" fill="hold">
                                           <p:stCondLst>
                                             <p:cond delay="0"/>
                                           </p:stCondLst>
@@ -5940,7 +5934,7 @@
                                     </p:set>
                                     <p:anim calcmode="lin" valueType="num">
                                       <p:cBhvr>
-                                        <p:cTn id="12" dur="500" fill="hold"/>
+                                        <p:cTn id="11" dur="500" fill="hold"/>
                                         <p:tgtEl>
                                           <p:spTgt spid="6"/>
                                         </p:tgtEl>
@@ -5963,7 +5957,7 @@
                                     </p:anim>
                                     <p:anim calcmode="lin" valueType="num">
                                       <p:cBhvr>
-                                        <p:cTn id="13" dur="500" fill="hold"/>
+                                        <p:cTn id="12" dur="500" fill="hold"/>
                                         <p:tgtEl>
                                           <p:spTgt spid="6"/>
                                         </p:tgtEl>
@@ -5986,7 +5980,7 @@
                                     </p:anim>
                                     <p:animEffect transition="in" filter="fade">
                                       <p:cBhvr>
-                                        <p:cTn id="14" dur="500"/>
+                                        <p:cTn id="13" dur="500"/>
                                         <p:tgtEl>
                                           <p:spTgt spid="6"/>
                                         </p:tgtEl>
@@ -6002,26 +5996,26 @@
                     </p:cTn>
                   </p:par>
                   <p:par>
-                    <p:cTn id="15" fill="hold">
+                    <p:cTn id="14" fill="hold">
                       <p:stCondLst>
                         <p:cond delay="indefinite"/>
                       </p:stCondLst>
                       <p:childTnLst>
                         <p:par>
-                          <p:cTn id="16" fill="hold">
+                          <p:cTn id="15" fill="hold">
                             <p:stCondLst>
                               <p:cond delay="0"/>
                             </p:stCondLst>
                             <p:childTnLst>
                               <p:par>
-                                <p:cTn id="17" presetID="12" presetClass="entr" presetSubtype="8" fill="hold" grpId="0" nodeType="clickEffect">
+                                <p:cTn id="16" presetID="12" presetClass="entr" presetSubtype="8" fill="hold" grpId="0" nodeType="clickEffect">
                                   <p:stCondLst>
                                     <p:cond delay="0"/>
                                   </p:stCondLst>
                                   <p:childTnLst>
                                     <p:set>
                                       <p:cBhvr>
-                                        <p:cTn id="18" dur="1" fill="hold">
+                                        <p:cTn id="17" dur="1" fill="hold">
                                           <p:stCondLst>
                                             <p:cond delay="0"/>
                                           </p:stCondLst>
@@ -6039,7 +6033,7 @@
                                     </p:set>
                                     <p:animEffect transition="in" filter="slide(fromLeft)">
                                       <p:cBhvr>
-                                        <p:cTn id="19" dur="500"/>
+                                        <p:cTn id="18" dur="500"/>
                                         <p:tgtEl>
                                           <p:spTgt spid="7"/>
                                         </p:tgtEl>
@@ -6051,30 +6045,21 @@
                             </p:childTnLst>
                           </p:cTn>
                         </p:par>
-                      </p:childTnLst>
-                    </p:cTn>
-                  </p:par>
-                  <p:par>
-                    <p:cTn id="20" fill="hold">
-                      <p:stCondLst>
-                        <p:cond delay="indefinite"/>
-                      </p:stCondLst>
-                      <p:childTnLst>
                         <p:par>
-                          <p:cTn id="21" fill="hold">
+                          <p:cTn id="19" fill="hold">
                             <p:stCondLst>
-                              <p:cond delay="0"/>
+                              <p:cond delay="500"/>
                             </p:stCondLst>
                             <p:childTnLst>
                               <p:par>
-                                <p:cTn id="22" presetID="8" presetClass="entr" presetSubtype="16" fill="hold" nodeType="clickEffect">
+                                <p:cTn id="20" presetID="8" presetClass="entr" presetSubtype="16" fill="hold" nodeType="afterEffect">
                                   <p:stCondLst>
                                     <p:cond delay="0"/>
                                   </p:stCondLst>
                                   <p:childTnLst>
                                     <p:set>
                                       <p:cBhvr>
-                                        <p:cTn id="23" dur="1" fill="hold">
+                                        <p:cTn id="21" dur="1" fill="hold">
                                           <p:stCondLst>
                                             <p:cond delay="0"/>
                                           </p:stCondLst>
@@ -6092,7 +6077,7 @@
                                     </p:set>
                                     <p:animEffect transition="in" filter="diamond(in)">
                                       <p:cBhvr>
-                                        <p:cTn id="24" dur="3000"/>
+                                        <p:cTn id="22" dur="500"/>
                                         <p:tgtEl>
                                           <p:spTgt spid="15"/>
                                         </p:tgtEl>
@@ -6105,20 +6090,20 @@
                           </p:cTn>
                         </p:par>
                         <p:par>
-                          <p:cTn id="25" fill="hold">
+                          <p:cTn id="23" fill="hold">
                             <p:stCondLst>
-                              <p:cond delay="3000"/>
+                              <p:cond delay="1000"/>
                             </p:stCondLst>
                             <p:childTnLst>
                               <p:par>
-                                <p:cTn id="26" presetID="12" presetClass="entr" presetSubtype="4" fill="hold" grpId="0" nodeType="afterEffect">
+                                <p:cTn id="24" presetID="12" presetClass="entr" presetSubtype="4" fill="hold" grpId="0" nodeType="afterEffect">
                                   <p:stCondLst>
                                     <p:cond delay="0"/>
                                   </p:stCondLst>
                                   <p:childTnLst>
                                     <p:set>
                                       <p:cBhvr>
-                                        <p:cTn id="27" dur="1" fill="hold">
+                                        <p:cTn id="25" dur="1" fill="hold">
                                           <p:stCondLst>
                                             <p:cond delay="0"/>
                                           </p:stCondLst>
@@ -6136,7 +6121,7 @@
                                     </p:set>
                                     <p:animEffect transition="in" filter="slide(fromBottom)">
                                       <p:cBhvr>
-                                        <p:cTn id="28" dur="500"/>
+                                        <p:cTn id="26" dur="500"/>
                                         <p:tgtEl>
                                           <p:spTgt spid="14"/>
                                         </p:tgtEl>
@@ -6149,20 +6134,20 @@
                           </p:cTn>
                         </p:par>
                         <p:par>
-                          <p:cTn id="29" fill="hold">
+                          <p:cTn id="27" fill="hold">
                             <p:stCondLst>
-                              <p:cond delay="3500"/>
+                              <p:cond delay="1500"/>
                             </p:stCondLst>
                             <p:childTnLst>
                               <p:par>
-                                <p:cTn id="30" presetID="53" presetClass="entr" presetSubtype="0" fill="hold" nodeType="afterEffect">
+                                <p:cTn id="28" presetID="53" presetClass="entr" presetSubtype="0" fill="hold" nodeType="afterEffect">
                                   <p:stCondLst>
                                     <p:cond delay="0"/>
                                   </p:stCondLst>
                                   <p:childTnLst>
                                     <p:set>
                                       <p:cBhvr>
-                                        <p:cTn id="31" dur="1" fill="hold">
+                                        <p:cTn id="29" dur="1" fill="hold">
                                           <p:stCondLst>
                                             <p:cond delay="0"/>
                                           </p:stCondLst>
@@ -6180,7 +6165,7 @@
                                     </p:set>
                                     <p:anim calcmode="lin" valueType="num">
                                       <p:cBhvr>
-                                        <p:cTn id="32" dur="500" fill="hold"/>
+                                        <p:cTn id="30" dur="500" fill="hold"/>
                                         <p:tgtEl>
                                           <p:spTgt spid="17"/>
                                         </p:tgtEl>
@@ -6203,7 +6188,7 @@
                                     </p:anim>
                                     <p:anim calcmode="lin" valueType="num">
                                       <p:cBhvr>
-                                        <p:cTn id="33" dur="500" fill="hold"/>
+                                        <p:cTn id="31" dur="500" fill="hold"/>
                                         <p:tgtEl>
                                           <p:spTgt spid="17"/>
                                         </p:tgtEl>
@@ -6226,7 +6211,7 @@
                                     </p:anim>
                                     <p:animEffect transition="in" filter="fade">
                                       <p:cBhvr>
-                                        <p:cTn id="34" dur="500"/>
+                                        <p:cTn id="32" dur="500"/>
                                         <p:tgtEl>
                                           <p:spTgt spid="17"/>
                                         </p:tgtEl>
@@ -6239,20 +6224,20 @@
                           </p:cTn>
                         </p:par>
                         <p:par>
-                          <p:cTn id="35" fill="hold">
+                          <p:cTn id="33" fill="hold">
                             <p:stCondLst>
-                              <p:cond delay="4000"/>
+                              <p:cond delay="2000"/>
                             </p:stCondLst>
                             <p:childTnLst>
                               <p:par>
-                                <p:cTn id="36" presetID="53" presetClass="entr" presetSubtype="0" fill="hold" nodeType="afterEffect">
+                                <p:cTn id="34" presetID="53" presetClass="entr" presetSubtype="0" fill="hold" nodeType="afterEffect">
                                   <p:stCondLst>
                                     <p:cond delay="0"/>
                                   </p:stCondLst>
                                   <p:childTnLst>
                                     <p:set>
                                       <p:cBhvr>
-                                        <p:cTn id="37" dur="1" fill="hold">
+                                        <p:cTn id="35" dur="1" fill="hold">
                                           <p:stCondLst>
                                             <p:cond delay="0"/>
                                           </p:stCondLst>
@@ -6270,7 +6255,7 @@
                                     </p:set>
                                     <p:anim calcmode="lin" valueType="num">
                                       <p:cBhvr>
-                                        <p:cTn id="38" dur="500" fill="hold"/>
+                                        <p:cTn id="36" dur="500" fill="hold"/>
                                         <p:tgtEl>
                                           <p:spTgt spid="16"/>
                                         </p:tgtEl>
@@ -6293,7 +6278,7 @@
                                     </p:anim>
                                     <p:anim calcmode="lin" valueType="num">
                                       <p:cBhvr>
-                                        <p:cTn id="39" dur="500" fill="hold"/>
+                                        <p:cTn id="37" dur="500" fill="hold"/>
                                         <p:tgtEl>
                                           <p:spTgt spid="16"/>
                                         </p:tgtEl>
@@ -6316,7 +6301,7 @@
                                     </p:anim>
                                     <p:animEffect transition="in" filter="fade">
                                       <p:cBhvr>
-                                        <p:cTn id="40" dur="500"/>
+                                        <p:cTn id="38" dur="500"/>
                                         <p:tgtEl>
                                           <p:spTgt spid="16"/>
                                         </p:tgtEl>

</xml_diff>